<commit_message>
Update to submission docs
</commit_message>
<xml_diff>
--- a/beachsmart_viva_presentation.pptx
+++ b/beachsmart_viva_presentation.pptx
@@ -5,15 +5,16 @@
     <p:sldMasterId id="2147483660" r:id="rId1"/>
   </p:sldMasterIdLst>
   <p:notesMasterIdLst>
-    <p:notesMasterId r:id="rId8"/>
+    <p:notesMasterId r:id="rId9"/>
   </p:notesMasterIdLst>
   <p:sldIdLst>
     <p:sldId id="256" r:id="rId2"/>
-    <p:sldId id="257" r:id="rId3"/>
-    <p:sldId id="259" r:id="rId4"/>
-    <p:sldId id="258" r:id="rId5"/>
-    <p:sldId id="261" r:id="rId6"/>
-    <p:sldId id="260" r:id="rId7"/>
+    <p:sldId id="262" r:id="rId3"/>
+    <p:sldId id="257" r:id="rId4"/>
+    <p:sldId id="259" r:id="rId5"/>
+    <p:sldId id="258" r:id="rId6"/>
+    <p:sldId id="261" r:id="rId7"/>
+    <p:sldId id="260" r:id="rId8"/>
   </p:sldIdLst>
   <p:sldSz cx="12192000" cy="6858000"/>
   <p:notesSz cx="6858000" cy="9144000"/>
@@ -112,6 +113,11 @@
       </a:defRPr>
     </a:lvl9pPr>
   </p:defaultTextStyle>
+  <p:extLst>
+    <p:ext uri="{EFAFB233-063F-42B5-8137-9DF3F51BA10A}">
+      <p15:sldGuideLst xmlns:p15="http://schemas.microsoft.com/office/powerpoint/2012/main"/>
+    </p:ext>
+  </p:extLst>
 </p:presentation>
 </file>
 
@@ -197,7 +203,7 @@
           <a:p>
             <a:fld id="{AC3D439E-8D2E-D04D-84DD-40B00284E92C}" type="datetimeFigureOut">
               <a:rPr lang="en-US" smtClean="0"/>
-              <a:t>10/6/22</a:t>
+              <a:t>10/11/22</a:t>
             </a:fld>
             <a:endParaRPr lang="en-US"/>
           </a:p>
@@ -512,9 +518,96 @@
             <a:pPr marL="228600" indent="-228600">
               <a:buAutoNum type="arabicPeriod"/>
             </a:pPr>
+            <a:endParaRPr lang="en-US" dirty="0"/>
+          </a:p>
+        </p:txBody>
+      </p:sp>
+      <p:sp>
+        <p:nvSpPr>
+          <p:cNvPr id="4" name="Slide Number Placeholder 3"/>
+          <p:cNvSpPr>
+            <a:spLocks noGrp="1"/>
+          </p:cNvSpPr>
+          <p:nvPr>
+            <p:ph type="sldNum" sz="quarter" idx="5"/>
+          </p:nvPr>
+        </p:nvSpPr>
+        <p:spPr/>
+        <p:txBody>
+          <a:bodyPr/>
+          <a:lstStyle/>
+          <a:p>
+            <a:fld id="{8651920D-6DA0-4B4A-9220-EF4AA9E823BE}" type="slidenum">
+              <a:rPr lang="en-US" smtClean="0"/>
+              <a:t>2</a:t>
+            </a:fld>
+            <a:endParaRPr lang="en-US"/>
+          </a:p>
+        </p:txBody>
+      </p:sp>
+    </p:spTree>
+    <p:extLst>
+      <p:ext uri="{BB962C8B-B14F-4D97-AF65-F5344CB8AC3E}">
+        <p14:creationId xmlns:p14="http://schemas.microsoft.com/office/powerpoint/2010/main" val="549208908"/>
+      </p:ext>
+    </p:extLst>
+  </p:cSld>
+  <p:clrMapOvr>
+    <a:masterClrMapping/>
+  </p:clrMapOvr>
+</p:notes>
+</file>
+
+<file path=ppt/notesSlides/notesSlide2.xml><?xml version="1.0" encoding="utf-8"?>
+<p:notes xmlns:a="http://schemas.openxmlformats.org/drawingml/2006/main" xmlns:r="http://schemas.openxmlformats.org/officeDocument/2006/relationships" xmlns:p="http://schemas.openxmlformats.org/presentationml/2006/main">
+  <p:cSld>
+    <p:spTree>
+      <p:nvGrpSpPr>
+        <p:cNvPr id="1" name=""/>
+        <p:cNvGrpSpPr/>
+        <p:nvPr/>
+      </p:nvGrpSpPr>
+      <p:grpSpPr>
+        <a:xfrm>
+          <a:off x="0" y="0"/>
+          <a:ext cx="0" cy="0"/>
+          <a:chOff x="0" y="0"/>
+          <a:chExt cx="0" cy="0"/>
+        </a:xfrm>
+      </p:grpSpPr>
+      <p:sp>
+        <p:nvSpPr>
+          <p:cNvPr id="2" name="Slide Image Placeholder 1"/>
+          <p:cNvSpPr>
+            <a:spLocks noGrp="1" noRot="1" noChangeAspect="1"/>
+          </p:cNvSpPr>
+          <p:nvPr>
+            <p:ph type="sldImg"/>
+          </p:nvPr>
+        </p:nvSpPr>
+        <p:spPr/>
+      </p:sp>
+      <p:sp>
+        <p:nvSpPr>
+          <p:cNvPr id="3" name="Notes Placeholder 2"/>
+          <p:cNvSpPr>
+            <a:spLocks noGrp="1"/>
+          </p:cNvSpPr>
+          <p:nvPr>
+            <p:ph type="body" idx="1"/>
+          </p:nvPr>
+        </p:nvSpPr>
+        <p:spPr/>
+        <p:txBody>
+          <a:bodyPr/>
+          <a:lstStyle/>
+          <a:p>
+            <a:pPr marL="228600" indent="-228600">
+              <a:buAutoNum type="arabicPeriod"/>
+            </a:pPr>
             <a:r>
               <a:rPr lang="en-US" dirty="0"/>
-              <a:t>A</a:t>
+              <a:t>This was across 17,000 incidents.</a:t>
             </a:r>
           </a:p>
           <a:p>
@@ -575,6 +668,33 @@
                 <a:latin typeface="Roboto Mono" pitchFamily="49" charset="0"/>
                 <a:ea typeface="Roboto Mono" pitchFamily="49" charset="0"/>
               </a:rPr>
+              <a:t>From 33,546 to 53, 665. There was also a 52% increase in daily rescue figures.</a:t>
+            </a:r>
+          </a:p>
+          <a:p>
+            <a:pPr marL="228600" marR="0" lvl="0" indent="-228600" algn="l" defTabSz="914400" rtl="0" eaLnBrk="1" fontAlgn="auto" latinLnBrk="0" hangingPunct="1">
+              <a:lnSpc>
+                <a:spcPct val="100000"/>
+              </a:lnSpc>
+              <a:spcBef>
+                <a:spcPts val="0"/>
+              </a:spcBef>
+              <a:spcAft>
+                <a:spcPts val="0"/>
+              </a:spcAft>
+              <a:buClrTx/>
+              <a:buSzTx/>
+              <a:buFontTx/>
+              <a:buAutoNum type="arabicPeriod"/>
+              <a:tabLst/>
+              <a:defRPr/>
+            </a:pPr>
+            <a:r>
+              <a:rPr lang="en-GB" dirty="0">
+                <a:effectLst/>
+                <a:latin typeface="Roboto Mono" pitchFamily="49" charset="0"/>
+                <a:ea typeface="Roboto Mono" pitchFamily="49" charset="0"/>
+              </a:rPr>
               <a:t>As we move into the post-covid era, there is concern that with large groups of people returning to the beaches, safety may be compromised.</a:t>
             </a:r>
           </a:p>
@@ -606,7 +726,7 @@
           <a:p>
             <a:fld id="{8651920D-6DA0-4B4A-9220-EF4AA9E823BE}" type="slidenum">
               <a:rPr lang="en-US" smtClean="0"/>
-              <a:t>2</a:t>
+              <a:t>3</a:t>
             </a:fld>
             <a:endParaRPr lang="en-US"/>
           </a:p>
@@ -616,6 +736,177 @@
     <p:extLst>
       <p:ext uri="{BB962C8B-B14F-4D97-AF65-F5344CB8AC3E}">
         <p14:creationId xmlns:p14="http://schemas.microsoft.com/office/powerpoint/2010/main" val="1185489609"/>
+      </p:ext>
+    </p:extLst>
+  </p:cSld>
+  <p:clrMapOvr>
+    <a:masterClrMapping/>
+  </p:clrMapOvr>
+</p:notes>
+</file>
+
+<file path=ppt/notesSlides/notesSlide3.xml><?xml version="1.0" encoding="utf-8"?>
+<p:notes xmlns:a="http://schemas.openxmlformats.org/drawingml/2006/main" xmlns:r="http://schemas.openxmlformats.org/officeDocument/2006/relationships" xmlns:p="http://schemas.openxmlformats.org/presentationml/2006/main">
+  <p:cSld>
+    <p:spTree>
+      <p:nvGrpSpPr>
+        <p:cNvPr id="1" name=""/>
+        <p:cNvGrpSpPr/>
+        <p:nvPr/>
+      </p:nvGrpSpPr>
+      <p:grpSpPr>
+        <a:xfrm>
+          <a:off x="0" y="0"/>
+          <a:ext cx="0" cy="0"/>
+          <a:chOff x="0" y="0"/>
+          <a:chExt cx="0" cy="0"/>
+        </a:xfrm>
+      </p:grpSpPr>
+      <p:sp>
+        <p:nvSpPr>
+          <p:cNvPr id="2" name="Slide Image Placeholder 1"/>
+          <p:cNvSpPr>
+            <a:spLocks noGrp="1" noRot="1" noChangeAspect="1"/>
+          </p:cNvSpPr>
+          <p:nvPr>
+            <p:ph type="sldImg"/>
+          </p:nvPr>
+        </p:nvSpPr>
+        <p:spPr/>
+      </p:sp>
+      <p:sp>
+        <p:nvSpPr>
+          <p:cNvPr id="3" name="Notes Placeholder 2"/>
+          <p:cNvSpPr>
+            <a:spLocks noGrp="1"/>
+          </p:cNvSpPr>
+          <p:nvPr>
+            <p:ph type="body" idx="1"/>
+          </p:nvPr>
+        </p:nvSpPr>
+        <p:spPr/>
+        <p:txBody>
+          <a:bodyPr/>
+          <a:lstStyle/>
+          <a:p>
+            <a:r>
+              <a:rPr lang="en-US" dirty="0"/>
+              <a:t>The north coast of Ireland is a beautiful and rugged coastline, much of which requires expertise to traverse and is largely unattended by safety officers or lifeguards.</a:t>
+            </a:r>
+          </a:p>
+        </p:txBody>
+      </p:sp>
+      <p:sp>
+        <p:nvSpPr>
+          <p:cNvPr id="4" name="Slide Number Placeholder 3"/>
+          <p:cNvSpPr>
+            <a:spLocks noGrp="1"/>
+          </p:cNvSpPr>
+          <p:nvPr>
+            <p:ph type="sldNum" sz="quarter" idx="5"/>
+          </p:nvPr>
+        </p:nvSpPr>
+        <p:spPr/>
+        <p:txBody>
+          <a:bodyPr/>
+          <a:lstStyle/>
+          <a:p>
+            <a:fld id="{8651920D-6DA0-4B4A-9220-EF4AA9E823BE}" type="slidenum">
+              <a:rPr lang="en-US" smtClean="0"/>
+              <a:t>4</a:t>
+            </a:fld>
+            <a:endParaRPr lang="en-US"/>
+          </a:p>
+        </p:txBody>
+      </p:sp>
+    </p:spTree>
+    <p:extLst>
+      <p:ext uri="{BB962C8B-B14F-4D97-AF65-F5344CB8AC3E}">
+        <p14:creationId xmlns:p14="http://schemas.microsoft.com/office/powerpoint/2010/main" val="1272112082"/>
+      </p:ext>
+    </p:extLst>
+  </p:cSld>
+  <p:clrMapOvr>
+    <a:masterClrMapping/>
+  </p:clrMapOvr>
+</p:notes>
+</file>
+
+<file path=ppt/notesSlides/notesSlide4.xml><?xml version="1.0" encoding="utf-8"?>
+<p:notes xmlns:a="http://schemas.openxmlformats.org/drawingml/2006/main" xmlns:r="http://schemas.openxmlformats.org/officeDocument/2006/relationships" xmlns:p="http://schemas.openxmlformats.org/presentationml/2006/main">
+  <p:cSld>
+    <p:spTree>
+      <p:nvGrpSpPr>
+        <p:cNvPr id="1" name=""/>
+        <p:cNvGrpSpPr/>
+        <p:nvPr/>
+      </p:nvGrpSpPr>
+      <p:grpSpPr>
+        <a:xfrm>
+          <a:off x="0" y="0"/>
+          <a:ext cx="0" cy="0"/>
+          <a:chOff x="0" y="0"/>
+          <a:chExt cx="0" cy="0"/>
+        </a:xfrm>
+      </p:grpSpPr>
+      <p:sp>
+        <p:nvSpPr>
+          <p:cNvPr id="2" name="Slide Image Placeholder 1"/>
+          <p:cNvSpPr>
+            <a:spLocks noGrp="1" noRot="1" noChangeAspect="1"/>
+          </p:cNvSpPr>
+          <p:nvPr>
+            <p:ph type="sldImg"/>
+          </p:nvPr>
+        </p:nvSpPr>
+        <p:spPr/>
+      </p:sp>
+      <p:sp>
+        <p:nvSpPr>
+          <p:cNvPr id="3" name="Notes Placeholder 2"/>
+          <p:cNvSpPr>
+            <a:spLocks noGrp="1"/>
+          </p:cNvSpPr>
+          <p:nvPr>
+            <p:ph type="body" idx="1"/>
+          </p:nvPr>
+        </p:nvSpPr>
+        <p:spPr/>
+        <p:txBody>
+          <a:bodyPr/>
+          <a:lstStyle/>
+          <a:p>
+            <a:endParaRPr lang="en-US" dirty="0"/>
+          </a:p>
+        </p:txBody>
+      </p:sp>
+      <p:sp>
+        <p:nvSpPr>
+          <p:cNvPr id="4" name="Slide Number Placeholder 3"/>
+          <p:cNvSpPr>
+            <a:spLocks noGrp="1"/>
+          </p:cNvSpPr>
+          <p:nvPr>
+            <p:ph type="sldNum" sz="quarter" idx="5"/>
+          </p:nvPr>
+        </p:nvSpPr>
+        <p:spPr/>
+        <p:txBody>
+          <a:bodyPr/>
+          <a:lstStyle/>
+          <a:p>
+            <a:fld id="{8651920D-6DA0-4B4A-9220-EF4AA9E823BE}" type="slidenum">
+              <a:rPr lang="en-US" smtClean="0"/>
+              <a:t>6</a:t>
+            </a:fld>
+            <a:endParaRPr lang="en-US"/>
+          </a:p>
+        </p:txBody>
+      </p:sp>
+    </p:spTree>
+    <p:extLst>
+      <p:ext uri="{BB962C8B-B14F-4D97-AF65-F5344CB8AC3E}">
+        <p14:creationId xmlns:p14="http://schemas.microsoft.com/office/powerpoint/2010/main" val="1090011207"/>
       </p:ext>
     </p:extLst>
   </p:cSld>
@@ -794,7 +1085,7 @@
           <a:p>
             <a:fld id="{25E11C50-A61C-C541-9F09-12DDEC11DEDC}" type="datetimeFigureOut">
               <a:rPr lang="en-US" smtClean="0"/>
-              <a:t>10/4/22</a:t>
+              <a:t>10/11/22</a:t>
             </a:fld>
             <a:endParaRPr lang="en-US"/>
           </a:p>
@@ -1124,7 +1415,7 @@
           <a:p>
             <a:fld id="{25E11C50-A61C-C541-9F09-12DDEC11DEDC}" type="datetimeFigureOut">
               <a:rPr lang="en-US" smtClean="0"/>
-              <a:t>10/4/22</a:t>
+              <a:t>10/11/22</a:t>
             </a:fld>
             <a:endParaRPr lang="en-US"/>
           </a:p>
@@ -1304,7 +1595,7 @@
           <a:p>
             <a:fld id="{25E11C50-A61C-C541-9F09-12DDEC11DEDC}" type="datetimeFigureOut">
               <a:rPr lang="en-US" smtClean="0"/>
-              <a:t>10/4/22</a:t>
+              <a:t>10/11/22</a:t>
             </a:fld>
             <a:endParaRPr lang="en-US"/>
           </a:p>
@@ -1474,7 +1765,7 @@
           <a:p>
             <a:fld id="{25E11C50-A61C-C541-9F09-12DDEC11DEDC}" type="datetimeFigureOut">
               <a:rPr lang="en-US" smtClean="0"/>
-              <a:t>10/4/22</a:t>
+              <a:t>10/11/22</a:t>
             </a:fld>
             <a:endParaRPr lang="en-US"/>
           </a:p>
@@ -1751,7 +2042,7 @@
           <a:p>
             <a:fld id="{25E11C50-A61C-C541-9F09-12DDEC11DEDC}" type="datetimeFigureOut">
               <a:rPr lang="en-US" smtClean="0"/>
-              <a:t>10/4/22</a:t>
+              <a:t>10/11/22</a:t>
             </a:fld>
             <a:endParaRPr lang="en-US"/>
           </a:p>
@@ -2145,7 +2436,7 @@
           <a:p>
             <a:fld id="{25E11C50-A61C-C541-9F09-12DDEC11DEDC}" type="datetimeFigureOut">
               <a:rPr lang="en-US" smtClean="0"/>
-              <a:t>10/4/22</a:t>
+              <a:t>10/11/22</a:t>
             </a:fld>
             <a:endParaRPr lang="en-US"/>
           </a:p>
@@ -2622,7 +2913,7 @@
           <a:p>
             <a:fld id="{25E11C50-A61C-C541-9F09-12DDEC11DEDC}" type="datetimeFigureOut">
               <a:rPr lang="en-US" smtClean="0"/>
-              <a:t>10/4/22</a:t>
+              <a:t>10/11/22</a:t>
             </a:fld>
             <a:endParaRPr lang="en-US"/>
           </a:p>
@@ -2740,7 +3031,7 @@
           <a:p>
             <a:fld id="{25E11C50-A61C-C541-9F09-12DDEC11DEDC}" type="datetimeFigureOut">
               <a:rPr lang="en-US" smtClean="0"/>
-              <a:t>10/4/22</a:t>
+              <a:t>10/11/22</a:t>
             </a:fld>
             <a:endParaRPr lang="en-US"/>
           </a:p>
@@ -2835,7 +3126,7 @@
           <a:p>
             <a:fld id="{25E11C50-A61C-C541-9F09-12DDEC11DEDC}" type="datetimeFigureOut">
               <a:rPr lang="en-US" smtClean="0"/>
-              <a:t>10/4/22</a:t>
+              <a:t>10/11/22</a:t>
             </a:fld>
             <a:endParaRPr lang="en-US"/>
           </a:p>
@@ -3181,7 +3472,7 @@
           <a:p>
             <a:fld id="{25E11C50-A61C-C541-9F09-12DDEC11DEDC}" type="datetimeFigureOut">
               <a:rPr lang="en-US" smtClean="0"/>
-              <a:t>10/4/22</a:t>
+              <a:t>10/11/22</a:t>
             </a:fld>
             <a:endParaRPr lang="en-US"/>
           </a:p>
@@ -3569,7 +3860,7 @@
           <a:p>
             <a:fld id="{25E11C50-A61C-C541-9F09-12DDEC11DEDC}" type="datetimeFigureOut">
               <a:rPr lang="en-US" smtClean="0"/>
-              <a:t>10/4/22</a:t>
+              <a:t>10/11/22</a:t>
             </a:fld>
             <a:endParaRPr lang="en-US"/>
           </a:p>
@@ -3847,7 +4138,7 @@
           <a:p>
             <a:fld id="{25E11C50-A61C-C541-9F09-12DDEC11DEDC}" type="datetimeFigureOut">
               <a:rPr lang="en-US" smtClean="0"/>
-              <a:t>10/4/22</a:t>
+              <a:t>10/11/22</a:t>
             </a:fld>
             <a:endParaRPr lang="en-US"/>
           </a:p>
@@ -4864,7 +5155,7 @@
                 <a:latin typeface="Roboto Mono" pitchFamily="49" charset="0"/>
                 <a:ea typeface="Roboto Mono" pitchFamily="49" charset="0"/>
               </a:rPr>
-              <a:t>Problem</a:t>
+              <a:t>Project Brief</a:t>
             </a:r>
           </a:p>
         </p:txBody>
@@ -4887,59 +5178,25 @@
         </p:nvSpPr>
         <p:spPr/>
         <p:txBody>
-          <a:bodyPr/>
+          <a:bodyPr>
+            <a:normAutofit/>
+          </a:bodyPr>
           <a:lstStyle/>
           <a:p>
-            <a:r>
-              <a:rPr lang="en-US" dirty="0">
-                <a:latin typeface="Roboto Mono" pitchFamily="49" charset="0"/>
-                <a:ea typeface="Roboto Mono" pitchFamily="49" charset="0"/>
-              </a:rPr>
-              <a:t>2019 – 30,000 people require rescuing by RNLI in U.K.</a:t>
-            </a:r>
-          </a:p>
-          <a:p>
-            <a:r>
-              <a:rPr lang="en-US" dirty="0">
-                <a:latin typeface="Roboto Mono" pitchFamily="49" charset="0"/>
-                <a:ea typeface="Roboto Mono" pitchFamily="49" charset="0"/>
-              </a:rPr>
-              <a:t>May 2020 - RNLI launch their beach smart campaign. </a:t>
-            </a:r>
-          </a:p>
-          <a:p>
-            <a:r>
-              <a:rPr lang="en-US" dirty="0">
-                <a:latin typeface="Roboto Mono" pitchFamily="49" charset="0"/>
-                <a:ea typeface="Roboto Mono" pitchFamily="49" charset="0"/>
-              </a:rPr>
-              <a:t>2022 - </a:t>
-            </a:r>
-            <a:r>
-              <a:rPr lang="en-GB" dirty="0">
-                <a:latin typeface="Roboto Mono" pitchFamily="49" charset="0"/>
-                <a:ea typeface="Roboto Mono" pitchFamily="49" charset="0"/>
-              </a:rPr>
-              <a:t>Many people expected to return to the beaches post-covid.</a:t>
-            </a:r>
-          </a:p>
-          <a:p>
-            <a:r>
-              <a:rPr lang="en-GB" dirty="0">
+            <a:pPr marL="0" indent="0">
+              <a:buNone/>
+            </a:pPr>
+            <a:r>
+              <a:rPr lang="en-GB" b="0" i="0" u="none" strike="noStrike" dirty="0">
+                <a:solidFill>
+                  <a:srgbClr val="000000"/>
+                </a:solidFill>
                 <a:effectLst/>
                 <a:latin typeface="Roboto Mono" pitchFamily="49" charset="0"/>
                 <a:ea typeface="Roboto Mono" pitchFamily="49" charset="0"/>
               </a:rPr>
-              <a:t>How to get more people the info?</a:t>
-            </a:r>
-          </a:p>
-          <a:p>
-            <a:endParaRPr lang="en-GB" dirty="0">
-              <a:latin typeface="Roboto Mono" pitchFamily="49" charset="0"/>
-              <a:ea typeface="Roboto Mono" pitchFamily="49" charset="0"/>
-            </a:endParaRPr>
-          </a:p>
-          <a:p>
+              <a:t>Using interactive web-based mapping, develop a range of features to support the development of a BeachSmart campaign informing residents &amp; visitors of environmental issues they should be aware of before using the renowned beaches &amp; coast of the Causeway Coast and Glens.</a:t>
+            </a:r>
             <a:endParaRPr lang="en-US" dirty="0">
               <a:latin typeface="Roboto Mono" pitchFamily="49" charset="0"/>
               <a:ea typeface="Roboto Mono" pitchFamily="49" charset="0"/>
@@ -4950,7 +5207,7 @@
     </p:spTree>
     <p:extLst>
       <p:ext uri="{BB962C8B-B14F-4D97-AF65-F5344CB8AC3E}">
-        <p14:creationId xmlns:p14="http://schemas.microsoft.com/office/powerpoint/2010/main" val="1771637531"/>
+        <p14:creationId xmlns:p14="http://schemas.microsoft.com/office/powerpoint/2010/main" val="77854823"/>
       </p:ext>
     </p:extLst>
   </p:cSld>
@@ -4982,7 +5239,7 @@
           <p:cNvPr id="2" name="Title 1">
             <a:extLst>
               <a:ext uri="{FF2B5EF4-FFF2-40B4-BE49-F238E27FC236}">
-                <a16:creationId xmlns:a16="http://schemas.microsoft.com/office/drawing/2014/main" id="{8337F6FC-3E41-BF8C-8226-E59F4F375EA4}"/>
+                <a16:creationId xmlns:a16="http://schemas.microsoft.com/office/drawing/2014/main" id="{39758E25-7DCC-52AB-0BA3-DEB1F24C0092}"/>
               </a:ext>
             </a:extLst>
           </p:cNvPr>
@@ -5006,7 +5263,7 @@
                 <a:latin typeface="Roboto Mono" pitchFamily="49" charset="0"/>
                 <a:ea typeface="Roboto Mono" pitchFamily="49" charset="0"/>
               </a:rPr>
-              <a:t>Solution</a:t>
+              <a:t>Problem</a:t>
             </a:r>
           </a:p>
         </p:txBody>
@@ -5016,7 +5273,7 @@
           <p:cNvPr id="3" name="Content Placeholder 2">
             <a:extLst>
               <a:ext uri="{FF2B5EF4-FFF2-40B4-BE49-F238E27FC236}">
-                <a16:creationId xmlns:a16="http://schemas.microsoft.com/office/drawing/2014/main" id="{D157036A-71AC-8123-90A6-1C4D9FBE78BB}"/>
+                <a16:creationId xmlns:a16="http://schemas.microsoft.com/office/drawing/2014/main" id="{430723BD-CA00-F556-7BC0-780826394597}"/>
               </a:ext>
             </a:extLst>
           </p:cNvPr>
@@ -5031,6 +5288,49 @@
         <p:txBody>
           <a:bodyPr/>
           <a:lstStyle/>
+          <a:p>
+            <a:r>
+              <a:rPr lang="en-US" dirty="0">
+                <a:latin typeface="Roboto Mono" pitchFamily="49" charset="0"/>
+                <a:ea typeface="Roboto Mono" pitchFamily="49" charset="0"/>
+              </a:rPr>
+              <a:t>2019 – 30,000 people require rescuing by RNLI in U.K. – 200 of which were in Northern Ireland.</a:t>
+            </a:r>
+          </a:p>
+          <a:p>
+            <a:r>
+              <a:rPr lang="en-US" dirty="0">
+                <a:latin typeface="Roboto Mono" pitchFamily="49" charset="0"/>
+                <a:ea typeface="Roboto Mono" pitchFamily="49" charset="0"/>
+              </a:rPr>
+              <a:t>May 2020 - RNLI launch their beach smart campaign.</a:t>
+            </a:r>
+          </a:p>
+          <a:p>
+            <a:r>
+              <a:rPr lang="en-US" dirty="0">
+                <a:latin typeface="Roboto Mono" pitchFamily="49" charset="0"/>
+                <a:ea typeface="Roboto Mono" pitchFamily="49" charset="0"/>
+              </a:rPr>
+              <a:t>2021 – 60% annual increase in aid required. </a:t>
+            </a:r>
+          </a:p>
+          <a:p>
+            <a:r>
+              <a:rPr lang="en-US" dirty="0">
+                <a:latin typeface="Roboto Mono" pitchFamily="49" charset="0"/>
+                <a:ea typeface="Roboto Mono" pitchFamily="49" charset="0"/>
+              </a:rPr>
+              <a:t>2022 - </a:t>
+            </a:r>
+            <a:r>
+              <a:rPr lang="en-GB" dirty="0">
+                <a:latin typeface="Roboto Mono" pitchFamily="49" charset="0"/>
+                <a:ea typeface="Roboto Mono" pitchFamily="49" charset="0"/>
+              </a:rPr>
+              <a:t>Many people expected to return to the beaches post-covid.</a:t>
+            </a:r>
+          </a:p>
           <a:p>
             <a:r>
               <a:rPr lang="en-GB" dirty="0">
@@ -5038,50 +5338,10 @@
                 <a:latin typeface="Roboto Mono" pitchFamily="49" charset="0"/>
                 <a:ea typeface="Roboto Mono" pitchFamily="49" charset="0"/>
               </a:rPr>
-              <a:t>The beach smart web app.</a:t>
-            </a:r>
-          </a:p>
-          <a:p>
-            <a:r>
-              <a:rPr lang="en-GB" dirty="0">
-                <a:latin typeface="Roboto Mono" pitchFamily="49" charset="0"/>
-                <a:ea typeface="Roboto Mono" pitchFamily="49" charset="0"/>
-              </a:rPr>
-              <a:t>Beach smart </a:t>
-            </a:r>
-            <a:r>
-              <a:rPr lang="en-GB" dirty="0">
-                <a:effectLst/>
-                <a:latin typeface="Roboto Mono" pitchFamily="49" charset="0"/>
-                <a:ea typeface="Roboto Mono" pitchFamily="49" charset="0"/>
-              </a:rPr>
-              <a:t>provides a single information portal for towns </a:t>
-            </a:r>
-            <a:r>
-              <a:rPr lang="en-GB" dirty="0">
-                <a:latin typeface="Roboto Mono" pitchFamily="49" charset="0"/>
-                <a:ea typeface="Roboto Mono" pitchFamily="49" charset="0"/>
-              </a:rPr>
-              <a:t>along the</a:t>
-            </a:r>
-            <a:r>
-              <a:rPr lang="en-GB" dirty="0">
-                <a:effectLst/>
-                <a:latin typeface="Roboto Mono" pitchFamily="49" charset="0"/>
-                <a:ea typeface="Roboto Mono" pitchFamily="49" charset="0"/>
-              </a:rPr>
-              <a:t> Causeway Coast &amp; Glens coast.</a:t>
-            </a:r>
-          </a:p>
-          <a:p>
-            <a:r>
-              <a:rPr lang="en-GB" dirty="0">
-                <a:effectLst/>
-                <a:latin typeface="Roboto Mono" pitchFamily="49" charset="0"/>
-                <a:ea typeface="Roboto Mono" pitchFamily="49" charset="0"/>
-              </a:rPr>
-              <a:t>Users can use the app to explore beaches, coastline and towns, including local landmarks, entertainment, eateries and shops in Portstewart</a:t>
-            </a:r>
+              <a:t>How to get more people the info?</a:t>
+            </a:r>
+          </a:p>
+          <a:p>
             <a:endParaRPr lang="en-GB" dirty="0">
               <a:latin typeface="Roboto Mono" pitchFamily="49" charset="0"/>
               <a:ea typeface="Roboto Mono" pitchFamily="49" charset="0"/>
@@ -5098,7 +5358,7 @@
     </p:spTree>
     <p:extLst>
       <p:ext uri="{BB962C8B-B14F-4D97-AF65-F5344CB8AC3E}">
-        <p14:creationId xmlns:p14="http://schemas.microsoft.com/office/powerpoint/2010/main" val="429037360"/>
+        <p14:creationId xmlns:p14="http://schemas.microsoft.com/office/powerpoint/2010/main" val="1771637531"/>
       </p:ext>
     </p:extLst>
   </p:cSld>
@@ -5130,7 +5390,7 @@
           <p:cNvPr id="2" name="Title 1">
             <a:extLst>
               <a:ext uri="{FF2B5EF4-FFF2-40B4-BE49-F238E27FC236}">
-                <a16:creationId xmlns:a16="http://schemas.microsoft.com/office/drawing/2014/main" id="{1F8EC44D-55FD-6E92-6C9E-EF53AF24E376}"/>
+                <a16:creationId xmlns:a16="http://schemas.microsoft.com/office/drawing/2014/main" id="{8337F6FC-3E41-BF8C-8226-E59F4F375EA4}"/>
               </a:ext>
             </a:extLst>
           </p:cNvPr>
@@ -5154,7 +5414,7 @@
                 <a:latin typeface="Roboto Mono" pitchFamily="49" charset="0"/>
                 <a:ea typeface="Roboto Mono" pitchFamily="49" charset="0"/>
               </a:rPr>
-              <a:t>Technology</a:t>
+              <a:t>Solution</a:t>
             </a:r>
           </a:p>
         </p:txBody>
@@ -5164,7 +5424,7 @@
           <p:cNvPr id="3" name="Content Placeholder 2">
             <a:extLst>
               <a:ext uri="{FF2B5EF4-FFF2-40B4-BE49-F238E27FC236}">
-                <a16:creationId xmlns:a16="http://schemas.microsoft.com/office/drawing/2014/main" id="{E58ABAE8-9B70-BFC1-2B7B-7FD3F72B5368}"/>
+                <a16:creationId xmlns:a16="http://schemas.microsoft.com/office/drawing/2014/main" id="{D157036A-71AC-8123-90A6-1C4D9FBE78BB}"/>
               </a:ext>
             </a:extLst>
           </p:cNvPr>
@@ -5172,7 +5432,7 @@
             <a:spLocks noGrp="1"/>
           </p:cNvSpPr>
           <p:nvPr>
-            <p:ph sz="half" idx="1"/>
+            <p:ph idx="1"/>
           </p:nvPr>
         </p:nvSpPr>
         <p:spPr/>
@@ -5181,140 +5441,72 @@
           <a:lstStyle/>
           <a:p>
             <a:r>
-              <a:rPr lang="en-US" dirty="0">
+              <a:rPr lang="en-GB" dirty="0">
+                <a:effectLst/>
                 <a:latin typeface="Roboto Mono" pitchFamily="49" charset="0"/>
                 <a:ea typeface="Roboto Mono" pitchFamily="49" charset="0"/>
               </a:rPr>
-              <a:t>Front end</a:t>
-            </a:r>
-          </a:p>
-          <a:p>
-            <a:pPr lvl="1"/>
-            <a:r>
-              <a:rPr lang="en-US" dirty="0">
+              <a:t>The beach smart web app.</a:t>
+            </a:r>
+          </a:p>
+          <a:p>
+            <a:r>
+              <a:rPr lang="en-GB" dirty="0">
                 <a:latin typeface="Roboto Mono" pitchFamily="49" charset="0"/>
                 <a:ea typeface="Roboto Mono" pitchFamily="49" charset="0"/>
               </a:rPr>
-              <a:t>React</a:t>
-            </a:r>
-          </a:p>
-          <a:p>
-            <a:pPr lvl="1"/>
-            <a:r>
-              <a:rPr lang="en-US" dirty="0">
+              <a:t>Beach smart </a:t>
+            </a:r>
+            <a:r>
+              <a:rPr lang="en-GB" dirty="0">
+                <a:effectLst/>
                 <a:latin typeface="Roboto Mono" pitchFamily="49" charset="0"/>
                 <a:ea typeface="Roboto Mono" pitchFamily="49" charset="0"/>
               </a:rPr>
-              <a:t>JavaScript</a:t>
-            </a:r>
-          </a:p>
-          <a:p>
-            <a:pPr lvl="1"/>
-            <a:r>
-              <a:rPr lang="en-US" dirty="0">
+              <a:t>provides a single information portal for towns </a:t>
+            </a:r>
+            <a:r>
+              <a:rPr lang="en-GB" dirty="0">
                 <a:latin typeface="Roboto Mono" pitchFamily="49" charset="0"/>
                 <a:ea typeface="Roboto Mono" pitchFamily="49" charset="0"/>
               </a:rPr>
-              <a:t>Leaflet</a:t>
-            </a:r>
-          </a:p>
-          <a:p>
-            <a:pPr lvl="1"/>
-            <a:r>
-              <a:rPr lang="en-US" dirty="0">
+              <a:t>along the</a:t>
+            </a:r>
+            <a:r>
+              <a:rPr lang="en-GB" dirty="0">
+                <a:effectLst/>
                 <a:latin typeface="Roboto Mono" pitchFamily="49" charset="0"/>
                 <a:ea typeface="Roboto Mono" pitchFamily="49" charset="0"/>
               </a:rPr>
-              <a:t>HTML</a:t>
-            </a:r>
-          </a:p>
-          <a:p>
-            <a:pPr lvl="1"/>
-            <a:r>
-              <a:rPr lang="en-US" dirty="0">
+              <a:t> Causeway Coast &amp; Glens coast.</a:t>
+            </a:r>
+          </a:p>
+          <a:p>
+            <a:r>
+              <a:rPr lang="en-GB" dirty="0">
+                <a:effectLst/>
                 <a:latin typeface="Roboto Mono" pitchFamily="49" charset="0"/>
                 <a:ea typeface="Roboto Mono" pitchFamily="49" charset="0"/>
               </a:rPr>
-              <a:t>CSS</a:t>
-            </a:r>
-          </a:p>
-          <a:p>
-            <a:pPr lvl="1"/>
-            <a:r>
-              <a:rPr lang="en-US" dirty="0">
-                <a:latin typeface="Roboto Mono" pitchFamily="49" charset="0"/>
-                <a:ea typeface="Roboto Mono" pitchFamily="49" charset="0"/>
-              </a:rPr>
-              <a:t>Bootstrap</a:t>
-            </a:r>
-          </a:p>
-        </p:txBody>
-      </p:sp>
-      <p:sp>
-        <p:nvSpPr>
-          <p:cNvPr id="4" name="Content Placeholder 3">
-            <a:extLst>
-              <a:ext uri="{FF2B5EF4-FFF2-40B4-BE49-F238E27FC236}">
-                <a16:creationId xmlns:a16="http://schemas.microsoft.com/office/drawing/2014/main" id="{5B490E86-4ACE-38FC-51F7-B9562668C727}"/>
-              </a:ext>
-            </a:extLst>
-          </p:cNvPr>
-          <p:cNvSpPr>
-            <a:spLocks noGrp="1"/>
-          </p:cNvSpPr>
-          <p:nvPr>
-            <p:ph sz="half" idx="2"/>
-          </p:nvPr>
-        </p:nvSpPr>
-        <p:spPr/>
-        <p:txBody>
-          <a:bodyPr/>
-          <a:lstStyle/>
-          <a:p>
-            <a:r>
-              <a:rPr lang="en-US" dirty="0">
-                <a:latin typeface="Roboto Mono" pitchFamily="49" charset="0"/>
-                <a:ea typeface="Roboto Mono" pitchFamily="49" charset="0"/>
-              </a:rPr>
-              <a:t>Back end</a:t>
-            </a:r>
-          </a:p>
-          <a:p>
-            <a:pPr lvl="1"/>
-            <a:r>
-              <a:rPr lang="en-US" dirty="0">
-                <a:latin typeface="Roboto Mono" pitchFamily="49" charset="0"/>
-                <a:ea typeface="Roboto Mono" pitchFamily="49" charset="0"/>
-              </a:rPr>
-              <a:t>PHP</a:t>
-            </a:r>
-          </a:p>
-          <a:p>
-            <a:pPr lvl="1"/>
-            <a:r>
-              <a:rPr lang="en-US" dirty="0">
-                <a:latin typeface="Roboto Mono" pitchFamily="49" charset="0"/>
-                <a:ea typeface="Roboto Mono" pitchFamily="49" charset="0"/>
-              </a:rPr>
-              <a:t>HTML</a:t>
-            </a:r>
-          </a:p>
-          <a:p>
-            <a:pPr lvl="1"/>
-            <a:r>
-              <a:rPr lang="en-US" dirty="0">
-                <a:latin typeface="Roboto Mono" pitchFamily="49" charset="0"/>
-                <a:ea typeface="Roboto Mono" pitchFamily="49" charset="0"/>
-              </a:rPr>
-              <a:t>MySQL</a:t>
-            </a:r>
+              <a:t>Users can use the app to explore beaches, coastline and towns, including local landmarks, entertainment, eateries and shops in Portstewart</a:t>
+            </a:r>
+            <a:endParaRPr lang="en-GB" dirty="0">
+              <a:latin typeface="Roboto Mono" pitchFamily="49" charset="0"/>
+              <a:ea typeface="Roboto Mono" pitchFamily="49" charset="0"/>
+            </a:endParaRPr>
+          </a:p>
+          <a:p>
+            <a:endParaRPr lang="en-US" dirty="0">
+              <a:latin typeface="Roboto Mono" pitchFamily="49" charset="0"/>
+              <a:ea typeface="Roboto Mono" pitchFamily="49" charset="0"/>
+            </a:endParaRPr>
           </a:p>
         </p:txBody>
       </p:sp>
     </p:spTree>
     <p:extLst>
       <p:ext uri="{BB962C8B-B14F-4D97-AF65-F5344CB8AC3E}">
-        <p14:creationId xmlns:p14="http://schemas.microsoft.com/office/powerpoint/2010/main" val="998264440"/>
+        <p14:creationId xmlns:p14="http://schemas.microsoft.com/office/powerpoint/2010/main" val="429037360"/>
       </p:ext>
     </p:extLst>
   </p:cSld>
@@ -5346,6 +5538,222 @@
           <p:cNvPr id="2" name="Title 1">
             <a:extLst>
               <a:ext uri="{FF2B5EF4-FFF2-40B4-BE49-F238E27FC236}">
+                <a16:creationId xmlns:a16="http://schemas.microsoft.com/office/drawing/2014/main" id="{1F8EC44D-55FD-6E92-6C9E-EF53AF24E376}"/>
+              </a:ext>
+            </a:extLst>
+          </p:cNvPr>
+          <p:cNvSpPr>
+            <a:spLocks noGrp="1"/>
+          </p:cNvSpPr>
+          <p:nvPr>
+            <p:ph type="title"/>
+          </p:nvPr>
+        </p:nvSpPr>
+        <p:spPr/>
+        <p:txBody>
+          <a:bodyPr/>
+          <a:lstStyle/>
+          <a:p>
+            <a:r>
+              <a:rPr lang="en-US" dirty="0">
+                <a:solidFill>
+                  <a:srgbClr val="002060"/>
+                </a:solidFill>
+                <a:latin typeface="Roboto Mono" pitchFamily="49" charset="0"/>
+                <a:ea typeface="Roboto Mono" pitchFamily="49" charset="0"/>
+              </a:rPr>
+              <a:t>Technology</a:t>
+            </a:r>
+          </a:p>
+        </p:txBody>
+      </p:sp>
+      <p:sp>
+        <p:nvSpPr>
+          <p:cNvPr id="3" name="Content Placeholder 2">
+            <a:extLst>
+              <a:ext uri="{FF2B5EF4-FFF2-40B4-BE49-F238E27FC236}">
+                <a16:creationId xmlns:a16="http://schemas.microsoft.com/office/drawing/2014/main" id="{E58ABAE8-9B70-BFC1-2B7B-7FD3F72B5368}"/>
+              </a:ext>
+            </a:extLst>
+          </p:cNvPr>
+          <p:cNvSpPr>
+            <a:spLocks noGrp="1"/>
+          </p:cNvSpPr>
+          <p:nvPr>
+            <p:ph sz="half" idx="1"/>
+          </p:nvPr>
+        </p:nvSpPr>
+        <p:spPr/>
+        <p:txBody>
+          <a:bodyPr/>
+          <a:lstStyle/>
+          <a:p>
+            <a:r>
+              <a:rPr lang="en-US" dirty="0">
+                <a:latin typeface="Roboto Mono" pitchFamily="49" charset="0"/>
+                <a:ea typeface="Roboto Mono" pitchFamily="49" charset="0"/>
+              </a:rPr>
+              <a:t>Front end</a:t>
+            </a:r>
+          </a:p>
+          <a:p>
+            <a:pPr lvl="1"/>
+            <a:r>
+              <a:rPr lang="en-US" dirty="0">
+                <a:latin typeface="Roboto Mono" pitchFamily="49" charset="0"/>
+                <a:ea typeface="Roboto Mono" pitchFamily="49" charset="0"/>
+              </a:rPr>
+              <a:t>React</a:t>
+            </a:r>
+          </a:p>
+          <a:p>
+            <a:pPr lvl="1"/>
+            <a:r>
+              <a:rPr lang="en-US" dirty="0">
+                <a:latin typeface="Roboto Mono" pitchFamily="49" charset="0"/>
+                <a:ea typeface="Roboto Mono" pitchFamily="49" charset="0"/>
+              </a:rPr>
+              <a:t>JavaScript</a:t>
+            </a:r>
+          </a:p>
+          <a:p>
+            <a:pPr lvl="1"/>
+            <a:r>
+              <a:rPr lang="en-US" dirty="0">
+                <a:latin typeface="Roboto Mono" pitchFamily="49" charset="0"/>
+                <a:ea typeface="Roboto Mono" pitchFamily="49" charset="0"/>
+              </a:rPr>
+              <a:t>Leaflet</a:t>
+            </a:r>
+          </a:p>
+          <a:p>
+            <a:pPr lvl="1"/>
+            <a:r>
+              <a:rPr lang="en-US" dirty="0">
+                <a:latin typeface="Roboto Mono" pitchFamily="49" charset="0"/>
+                <a:ea typeface="Roboto Mono" pitchFamily="49" charset="0"/>
+              </a:rPr>
+              <a:t>HTML</a:t>
+            </a:r>
+          </a:p>
+          <a:p>
+            <a:pPr lvl="1"/>
+            <a:r>
+              <a:rPr lang="en-US" dirty="0">
+                <a:latin typeface="Roboto Mono" pitchFamily="49" charset="0"/>
+                <a:ea typeface="Roboto Mono" pitchFamily="49" charset="0"/>
+              </a:rPr>
+              <a:t>CSS</a:t>
+            </a:r>
+          </a:p>
+          <a:p>
+            <a:pPr lvl="1"/>
+            <a:r>
+              <a:rPr lang="en-US" dirty="0">
+                <a:latin typeface="Roboto Mono" pitchFamily="49" charset="0"/>
+                <a:ea typeface="Roboto Mono" pitchFamily="49" charset="0"/>
+              </a:rPr>
+              <a:t>Bootstrap</a:t>
+            </a:r>
+          </a:p>
+        </p:txBody>
+      </p:sp>
+      <p:sp>
+        <p:nvSpPr>
+          <p:cNvPr id="4" name="Content Placeholder 3">
+            <a:extLst>
+              <a:ext uri="{FF2B5EF4-FFF2-40B4-BE49-F238E27FC236}">
+                <a16:creationId xmlns:a16="http://schemas.microsoft.com/office/drawing/2014/main" id="{5B490E86-4ACE-38FC-51F7-B9562668C727}"/>
+              </a:ext>
+            </a:extLst>
+          </p:cNvPr>
+          <p:cNvSpPr>
+            <a:spLocks noGrp="1"/>
+          </p:cNvSpPr>
+          <p:nvPr>
+            <p:ph sz="half" idx="2"/>
+          </p:nvPr>
+        </p:nvSpPr>
+        <p:spPr/>
+        <p:txBody>
+          <a:bodyPr/>
+          <a:lstStyle/>
+          <a:p>
+            <a:r>
+              <a:rPr lang="en-US" dirty="0">
+                <a:latin typeface="Roboto Mono" pitchFamily="49" charset="0"/>
+                <a:ea typeface="Roboto Mono" pitchFamily="49" charset="0"/>
+              </a:rPr>
+              <a:t>Back end</a:t>
+            </a:r>
+          </a:p>
+          <a:p>
+            <a:pPr lvl="1"/>
+            <a:r>
+              <a:rPr lang="en-US" dirty="0">
+                <a:latin typeface="Roboto Mono" pitchFamily="49" charset="0"/>
+                <a:ea typeface="Roboto Mono" pitchFamily="49" charset="0"/>
+              </a:rPr>
+              <a:t>PHP</a:t>
+            </a:r>
+          </a:p>
+          <a:p>
+            <a:pPr lvl="1"/>
+            <a:r>
+              <a:rPr lang="en-US" dirty="0">
+                <a:latin typeface="Roboto Mono" pitchFamily="49" charset="0"/>
+                <a:ea typeface="Roboto Mono" pitchFamily="49" charset="0"/>
+              </a:rPr>
+              <a:t>HTML</a:t>
+            </a:r>
+          </a:p>
+          <a:p>
+            <a:pPr lvl="1"/>
+            <a:r>
+              <a:rPr lang="en-US" dirty="0">
+                <a:latin typeface="Roboto Mono" pitchFamily="49" charset="0"/>
+                <a:ea typeface="Roboto Mono" pitchFamily="49" charset="0"/>
+              </a:rPr>
+              <a:t>MySQL</a:t>
+            </a:r>
+          </a:p>
+        </p:txBody>
+      </p:sp>
+    </p:spTree>
+    <p:extLst>
+      <p:ext uri="{BB962C8B-B14F-4D97-AF65-F5344CB8AC3E}">
+        <p14:creationId xmlns:p14="http://schemas.microsoft.com/office/powerpoint/2010/main" val="998264440"/>
+      </p:ext>
+    </p:extLst>
+  </p:cSld>
+  <p:clrMapOvr>
+    <a:masterClrMapping/>
+  </p:clrMapOvr>
+</p:sld>
+</file>
+
+<file path=ppt/slides/slide6.xml><?xml version="1.0" encoding="utf-8"?>
+<p:sld xmlns:a="http://schemas.openxmlformats.org/drawingml/2006/main" xmlns:r="http://schemas.openxmlformats.org/officeDocument/2006/relationships" xmlns:p="http://schemas.openxmlformats.org/presentationml/2006/main">
+  <p:cSld>
+    <p:spTree>
+      <p:nvGrpSpPr>
+        <p:cNvPr id="1" name=""/>
+        <p:cNvGrpSpPr/>
+        <p:nvPr/>
+      </p:nvGrpSpPr>
+      <p:grpSpPr>
+        <a:xfrm>
+          <a:off x="0" y="0"/>
+          <a:ext cx="0" cy="0"/>
+          <a:chOff x="0" y="0"/>
+          <a:chExt cx="0" cy="0"/>
+        </a:xfrm>
+      </p:grpSpPr>
+      <p:sp>
+        <p:nvSpPr>
+          <p:cNvPr id="2" name="Title 1">
+            <a:extLst>
+              <a:ext uri="{FF2B5EF4-FFF2-40B4-BE49-F238E27FC236}">
                 <a16:creationId xmlns:a16="http://schemas.microsoft.com/office/drawing/2014/main" id="{52628CF4-3753-5DDF-76F2-6B0ED15716F8}"/>
               </a:ext>
             </a:extLst>
@@ -5397,20 +5805,6 @@
           <a:lstStyle/>
           <a:p>
             <a:r>
-              <a:rPr lang="en-GB" dirty="0">
-                <a:effectLst/>
-                <a:latin typeface="Roboto Mono" pitchFamily="49" charset="0"/>
-                <a:ea typeface="Roboto Mono" pitchFamily="49" charset="0"/>
-              </a:rPr>
-              <a:t>I will now demo the </a:t>
-            </a:r>
-            <a:endParaRPr lang="en-US" dirty="0">
-              <a:latin typeface="Roboto Mono" pitchFamily="49" charset="0"/>
-              <a:ea typeface="Roboto Mono" pitchFamily="49" charset="0"/>
-            </a:endParaRPr>
-          </a:p>
-          <a:p>
-            <a:r>
               <a:rPr lang="en-US" dirty="0">
                 <a:latin typeface="Roboto Mono" pitchFamily="49" charset="0"/>
                 <a:ea typeface="Roboto Mono" pitchFamily="49" charset="0"/>
@@ -5419,30 +5813,6 @@
             </a:r>
           </a:p>
           <a:p>
-            <a:pPr lvl="1"/>
-            <a:r>
-              <a:rPr lang="en-US" dirty="0">
-                <a:latin typeface="Roboto Mono" pitchFamily="49" charset="0"/>
-                <a:ea typeface="Roboto Mono" pitchFamily="49" charset="0"/>
-              </a:rPr>
-              <a:t>React start app from </a:t>
-            </a:r>
-            <a:r>
-              <a:rPr lang="en-US" dirty="0" err="1">
-                <a:latin typeface="Roboto Mono" pitchFamily="49" charset="0"/>
-                <a:ea typeface="Roboto Mono" pitchFamily="49" charset="0"/>
-              </a:rPr>
-              <a:t>VSCode</a:t>
-            </a:r>
-            <a:r>
-              <a:rPr lang="en-US" dirty="0">
-                <a:latin typeface="Roboto Mono" pitchFamily="49" charset="0"/>
-                <a:ea typeface="Roboto Mono" pitchFamily="49" charset="0"/>
-              </a:rPr>
-              <a:t> – have preloaded?</a:t>
-            </a:r>
-          </a:p>
-          <a:p>
             <a:r>
               <a:rPr lang="en-US" dirty="0">
                 <a:latin typeface="Roboto Mono" pitchFamily="49" charset="0"/>
@@ -5450,21 +5820,6 @@
               </a:rPr>
               <a:t>Back end</a:t>
             </a:r>
-          </a:p>
-          <a:p>
-            <a:pPr lvl="1"/>
-            <a:r>
-              <a:rPr lang="en-US" dirty="0">
-                <a:latin typeface="Roboto Mono" pitchFamily="49" charset="0"/>
-                <a:ea typeface="Roboto Mono" pitchFamily="49" charset="0"/>
-                <a:hlinkClick r:id="rId2"/>
-              </a:rPr>
-              <a:t>http://localhost:8888/MSc/beachsmart/beachsmart-api/admin/index-admin.php</a:t>
-            </a:r>
-            <a:endParaRPr lang="en-US" dirty="0">
-              <a:latin typeface="Roboto Mono" pitchFamily="49" charset="0"/>
-              <a:ea typeface="Roboto Mono" pitchFamily="49" charset="0"/>
-            </a:endParaRPr>
           </a:p>
           <a:p>
             <a:pPr lvl="1"/>
@@ -5505,7 +5860,7 @@
 </p:sld>
 </file>
 
-<file path=ppt/slides/slide6.xml><?xml version="1.0" encoding="utf-8"?>
+<file path=ppt/slides/slide7.xml><?xml version="1.0" encoding="utf-8"?>
 <p:sld xmlns:a="http://schemas.openxmlformats.org/drawingml/2006/main" xmlns:r="http://schemas.openxmlformats.org/officeDocument/2006/relationships" xmlns:p="http://schemas.openxmlformats.org/presentationml/2006/main">
   <p:cSld>
     <p:spTree>

</xml_diff>